<commit_message>
update for colors and doughnut to split into 4
</commit_message>
<xml_diff>
--- a/CrashDashSlides.pptx
+++ b/CrashDashSlides.pptx
@@ -140,7 +140,7 @@
   <pc:docChgLst>
     <pc:chgData name="Lisa Drain" userId="b04c4cfdf2aea0c3" providerId="LiveId" clId="{82926AF3-350B-49C6-984F-B35D6D2DDEBB}"/>
     <pc:docChg chg="undo redo custSel addSld delSld modSld">
-      <pc:chgData name="Lisa Drain" userId="b04c4cfdf2aea0c3" providerId="LiveId" clId="{82926AF3-350B-49C6-984F-B35D6D2DDEBB}" dt="2023-04-20T03:46:17.204" v="409" actId="20577"/>
+      <pc:chgData name="Lisa Drain" userId="b04c4cfdf2aea0c3" providerId="LiveId" clId="{82926AF3-350B-49C6-984F-B35D6D2DDEBB}" dt="2023-04-20T04:38:49.195" v="423" actId="1076"/>
       <pc:docMkLst>
         <pc:docMk/>
       </pc:docMkLst>
@@ -258,7 +258,7 @@
         </pc:spChg>
       </pc:sldChg>
       <pc:sldChg chg="addSp delSp modSp mod">
-        <pc:chgData name="Lisa Drain" userId="b04c4cfdf2aea0c3" providerId="LiveId" clId="{82926AF3-350B-49C6-984F-B35D6D2DDEBB}" dt="2023-04-20T03:45:50.852" v="406" actId="1076"/>
+        <pc:chgData name="Lisa Drain" userId="b04c4cfdf2aea0c3" providerId="LiveId" clId="{82926AF3-350B-49C6-984F-B35D6D2DDEBB}" dt="2023-04-20T04:38:49.195" v="423" actId="1076"/>
         <pc:sldMkLst>
           <pc:docMk/>
           <pc:sldMk cId="2120897407" sldId="320"/>
@@ -280,7 +280,15 @@
           </ac:picMkLst>
         </pc:picChg>
         <pc:picChg chg="add mod">
-          <ac:chgData name="Lisa Drain" userId="b04c4cfdf2aea0c3" providerId="LiveId" clId="{82926AF3-350B-49C6-984F-B35D6D2DDEBB}" dt="2023-04-20T03:45:50.852" v="406" actId="1076"/>
+          <ac:chgData name="Lisa Drain" userId="b04c4cfdf2aea0c3" providerId="LiveId" clId="{82926AF3-350B-49C6-984F-B35D6D2DDEBB}" dt="2023-04-20T04:38:49.195" v="423" actId="1076"/>
+          <ac:picMkLst>
+            <pc:docMk/>
+            <pc:sldMk cId="2120897407" sldId="320"/>
+            <ac:picMk id="3" creationId="{86659211-8409-B992-4C15-D4062539C1DB}"/>
+          </ac:picMkLst>
+        </pc:picChg>
+        <pc:picChg chg="add del mod">
+          <ac:chgData name="Lisa Drain" userId="b04c4cfdf2aea0c3" providerId="LiveId" clId="{82926AF3-350B-49C6-984F-B35D6D2DDEBB}" dt="2023-04-20T04:38:42.187" v="420" actId="478"/>
           <ac:picMkLst>
             <pc:docMk/>
             <pc:sldMk cId="2120897407" sldId="320"/>
@@ -289,7 +297,7 @@
         </pc:picChg>
       </pc:sldChg>
       <pc:sldChg chg="addSp delSp modSp mod">
-        <pc:chgData name="Lisa Drain" userId="b04c4cfdf2aea0c3" providerId="LiveId" clId="{82926AF3-350B-49C6-984F-B35D6D2DDEBB}" dt="2023-04-20T03:44:14.535" v="381" actId="1076"/>
+        <pc:chgData name="Lisa Drain" userId="b04c4cfdf2aea0c3" providerId="LiveId" clId="{82926AF3-350B-49C6-984F-B35D6D2DDEBB}" dt="2023-04-20T04:38:31.285" v="419" actId="1076"/>
         <pc:sldMkLst>
           <pc:docMk/>
           <pc:sldMk cId="243330298" sldId="321"/>
@@ -302,6 +310,14 @@
             <ac:picMk id="3" creationId="{1F1469A9-F893-85AC-FC55-5E59ABF0D1F8}"/>
           </ac:picMkLst>
         </pc:picChg>
+        <pc:picChg chg="add mod">
+          <ac:chgData name="Lisa Drain" userId="b04c4cfdf2aea0c3" providerId="LiveId" clId="{82926AF3-350B-49C6-984F-B35D6D2DDEBB}" dt="2023-04-20T04:38:31.285" v="419" actId="1076"/>
+          <ac:picMkLst>
+            <pc:docMk/>
+            <pc:sldMk cId="243330298" sldId="321"/>
+            <ac:picMk id="3" creationId="{A2737B23-71DD-59AA-DF7B-D85F2B613C01}"/>
+          </ac:picMkLst>
+        </pc:picChg>
         <pc:picChg chg="del">
           <ac:chgData name="Lisa Drain" userId="b04c4cfdf2aea0c3" providerId="LiveId" clId="{82926AF3-350B-49C6-984F-B35D6D2DDEBB}" dt="2023-04-20T03:40:36.175" v="375" actId="478"/>
           <ac:picMkLst>
@@ -310,8 +326,8 @@
             <ac:picMk id="5" creationId="{F957483E-FF7D-A9DD-EEA0-1F065737BAD2}"/>
           </ac:picMkLst>
         </pc:picChg>
-        <pc:picChg chg="add mod">
-          <ac:chgData name="Lisa Drain" userId="b04c4cfdf2aea0c3" providerId="LiveId" clId="{82926AF3-350B-49C6-984F-B35D6D2DDEBB}" dt="2023-04-20T03:44:14.535" v="381" actId="1076"/>
+        <pc:picChg chg="add del mod">
+          <ac:chgData name="Lisa Drain" userId="b04c4cfdf2aea0c3" providerId="LiveId" clId="{82926AF3-350B-49C6-984F-B35D6D2DDEBB}" dt="2023-04-20T04:38:25.578" v="416" actId="478"/>
           <ac:picMkLst>
             <pc:docMk/>
             <pc:sldMk cId="243330298" sldId="321"/>
@@ -461,17 +477,33 @@
         </pc:spChg>
       </pc:sldChg>
       <pc:sldChg chg="addSp delSp modSp add mod">
-        <pc:chgData name="Lisa Drain" userId="b04c4cfdf2aea0c3" providerId="LiveId" clId="{82926AF3-350B-49C6-984F-B35D6D2DDEBB}" dt="2023-04-20T03:38:31.290" v="373" actId="20577"/>
+        <pc:chgData name="Lisa Drain" userId="b04c4cfdf2aea0c3" providerId="LiveId" clId="{82926AF3-350B-49C6-984F-B35D6D2DDEBB}" dt="2023-04-20T04:38:01.755" v="415" actId="1076"/>
         <pc:sldMkLst>
           <pc:docMk/>
           <pc:sldMk cId="1609587259" sldId="325"/>
         </pc:sldMkLst>
+        <pc:spChg chg="add">
+          <ac:chgData name="Lisa Drain" userId="b04c4cfdf2aea0c3" providerId="LiveId" clId="{82926AF3-350B-49C6-984F-B35D6D2DDEBB}" dt="2023-04-20T04:37:37.444" v="411"/>
+          <ac:spMkLst>
+            <pc:docMk/>
+            <pc:sldMk cId="1609587259" sldId="325"/>
+            <ac:spMk id="2" creationId="{2058F444-3619-BE9B-190C-81A67A6FEC87}"/>
+          </ac:spMkLst>
+        </pc:spChg>
         <pc:spChg chg="mod">
           <ac:chgData name="Lisa Drain" userId="b04c4cfdf2aea0c3" providerId="LiveId" clId="{82926AF3-350B-49C6-984F-B35D6D2DDEBB}" dt="2023-04-20T03:38:31.290" v="373" actId="20577"/>
           <ac:spMkLst>
             <pc:docMk/>
             <pc:sldMk cId="1609587259" sldId="325"/>
             <ac:spMk id="3" creationId="{56C9419A-CFA6-4C0B-9B57-57594DAD8B0A}"/>
+          </ac:spMkLst>
+        </pc:spChg>
+        <pc:spChg chg="add del mod">
+          <ac:chgData name="Lisa Drain" userId="b04c4cfdf2aea0c3" providerId="LiveId" clId="{82926AF3-350B-49C6-984F-B35D6D2DDEBB}" dt="2023-04-20T04:37:43.234" v="413"/>
+          <ac:spMkLst>
+            <pc:docMk/>
+            <pc:sldMk cId="1609587259" sldId="325"/>
+            <ac:spMk id="4" creationId="{0F7FAD2C-E699-B9BB-E50B-3CA7EF2ADD3C}"/>
           </ac:spMkLst>
         </pc:spChg>
         <pc:spChg chg="add del mod">
@@ -482,8 +514,8 @@
             <ac:spMk id="4" creationId="{3EA36579-A4FC-9C41-6A09-9EA405CF98F4}"/>
           </ac:spMkLst>
         </pc:spChg>
-        <pc:picChg chg="add mod">
-          <ac:chgData name="Lisa Drain" userId="b04c4cfdf2aea0c3" providerId="LiveId" clId="{82926AF3-350B-49C6-984F-B35D6D2DDEBB}" dt="2023-04-20T03:37:49.740" v="337" actId="1076"/>
+        <pc:picChg chg="add del mod">
+          <ac:chgData name="Lisa Drain" userId="b04c4cfdf2aea0c3" providerId="LiveId" clId="{82926AF3-350B-49C6-984F-B35D6D2DDEBB}" dt="2023-04-20T04:37:36.859" v="410" actId="478"/>
           <ac:picMkLst>
             <pc:docMk/>
             <pc:sldMk cId="1609587259" sldId="325"/>
@@ -496,6 +528,14 @@
             <pc:docMk/>
             <pc:sldMk cId="1609587259" sldId="325"/>
             <ac:picMk id="6" creationId="{87F91112-A5C0-4B96-AC4C-D38E24BA9331}"/>
+          </ac:picMkLst>
+        </pc:picChg>
+        <pc:picChg chg="add mod">
+          <ac:chgData name="Lisa Drain" userId="b04c4cfdf2aea0c3" providerId="LiveId" clId="{82926AF3-350B-49C6-984F-B35D6D2DDEBB}" dt="2023-04-20T04:38:01.755" v="415" actId="1076"/>
+          <ac:picMkLst>
+            <pc:docMk/>
+            <pc:sldMk cId="1609587259" sldId="325"/>
+            <ac:picMk id="7" creationId="{699EACC6-B36D-27AF-BE21-D289D635D058}"/>
           </ac:picMkLst>
         </pc:picChg>
       </pc:sldChg>
@@ -14047,10 +14087,10 @@
       </p:sp>
       <p:pic>
         <p:nvPicPr>
-          <p:cNvPr id="5" name="Picture 4">
+          <p:cNvPr id="3" name="Picture 2">
             <a:extLst>
               <a:ext uri="{FF2B5EF4-FFF2-40B4-BE49-F238E27FC236}">
-                <a16:creationId xmlns:a16="http://schemas.microsoft.com/office/drawing/2014/main" id="{21FDDCEA-A60D-63DE-0C21-DB1A5C4D746F}"/>
+                <a16:creationId xmlns:a16="http://schemas.microsoft.com/office/drawing/2014/main" id="{86659211-8409-B992-4C15-D4062539C1DB}"/>
               </a:ext>
             </a:extLst>
           </p:cNvPr>
@@ -14067,8 +14107,8 @@
         </p:blipFill>
         <p:spPr>
           <a:xfrm>
-            <a:off x="3733995" y="1528740"/>
-            <a:ext cx="4876605" cy="4964135"/>
+            <a:off x="3606089" y="1690688"/>
+            <a:ext cx="4979822" cy="4600297"/>
           </a:xfrm>
           <a:prstGeom prst="rect">
             <a:avLst/>
@@ -14171,10 +14211,10 @@
       </p:sp>
       <p:pic>
         <p:nvPicPr>
-          <p:cNvPr id="8" name="Picture 7">
+          <p:cNvPr id="3" name="Picture 2">
             <a:extLst>
               <a:ext uri="{FF2B5EF4-FFF2-40B4-BE49-F238E27FC236}">
-                <a16:creationId xmlns:a16="http://schemas.microsoft.com/office/drawing/2014/main" id="{F956EA6C-EE91-14BA-E67A-E3CF3696BED3}"/>
+                <a16:creationId xmlns:a16="http://schemas.microsoft.com/office/drawing/2014/main" id="{A2737B23-71DD-59AA-DF7B-D85F2B613C01}"/>
               </a:ext>
             </a:extLst>
           </p:cNvPr>
@@ -14191,8 +14231,8 @@
         </p:blipFill>
         <p:spPr>
           <a:xfrm>
-            <a:off x="3857312" y="1593185"/>
-            <a:ext cx="4477375" cy="4763165"/>
+            <a:off x="3811916" y="1409538"/>
+            <a:ext cx="4568167" cy="4946812"/>
           </a:xfrm>
           <a:prstGeom prst="rect">
             <a:avLst/>
@@ -14499,12 +14539,57 @@
           </a:p>
         </p:txBody>
       </p:sp>
+      <p:sp>
+        <p:nvSpPr>
+          <p:cNvPr id="2" name="AutoShape 2" descr="1681965289564">
+            <a:extLst>
+              <a:ext uri="{FF2B5EF4-FFF2-40B4-BE49-F238E27FC236}">
+                <a16:creationId xmlns:a16="http://schemas.microsoft.com/office/drawing/2014/main" id="{2058F444-3619-BE9B-190C-81A67A6FEC87}"/>
+              </a:ext>
+            </a:extLst>
+          </p:cNvPr>
+          <p:cNvSpPr>
+            <a:spLocks noChangeAspect="1" noChangeArrowheads="1"/>
+          </p:cNvSpPr>
+          <p:nvPr/>
+        </p:nvSpPr>
+        <p:spPr bwMode="auto">
+          <a:xfrm>
+            <a:off x="5943600" y="3276600"/>
+            <a:ext cx="304800" cy="304800"/>
+          </a:xfrm>
+          <a:prstGeom prst="rect">
+            <a:avLst/>
+          </a:prstGeom>
+          <a:noFill/>
+          <a:extLst>
+            <a:ext uri="{909E8E84-426E-40DD-AFC4-6F175D3DCCD1}">
+              <a14:hiddenFill xmlns:a14="http://schemas.microsoft.com/office/drawing/2010/main">
+                <a:solidFill>
+                  <a:srgbClr val="FFFFFF"/>
+                </a:solidFill>
+              </a14:hiddenFill>
+            </a:ext>
+          </a:extLst>
+        </p:spPr>
+        <p:txBody>
+          <a:bodyPr vert="horz" wrap="square" lIns="91440" tIns="45720" rIns="91440" bIns="45720" numCol="1" anchor="t" anchorCtr="0" compatLnSpc="1">
+            <a:prstTxWarp prst="textNoShape">
+              <a:avLst/>
+            </a:prstTxWarp>
+          </a:bodyPr>
+          <a:lstStyle/>
+          <a:p>
+            <a:endParaRPr lang="en-US"/>
+          </a:p>
+        </p:txBody>
+      </p:sp>
       <p:pic>
         <p:nvPicPr>
-          <p:cNvPr id="5" name="Picture 4">
+          <p:cNvPr id="7" name="Picture 6">
             <a:extLst>
               <a:ext uri="{FF2B5EF4-FFF2-40B4-BE49-F238E27FC236}">
-                <a16:creationId xmlns:a16="http://schemas.microsoft.com/office/drawing/2014/main" id="{CBF43212-62B8-785A-86EE-7B487BD30684}"/>
+                <a16:creationId xmlns:a16="http://schemas.microsoft.com/office/drawing/2014/main" id="{699EACC6-B36D-27AF-BE21-D289D635D058}"/>
               </a:ext>
             </a:extLst>
           </p:cNvPr>
@@ -14521,8 +14606,8 @@
         </p:blipFill>
         <p:spPr>
           <a:xfrm>
-            <a:off x="1004135" y="309039"/>
-            <a:ext cx="3713007" cy="6412436"/>
+            <a:off x="1054524" y="175758"/>
+            <a:ext cx="3667637" cy="6506483"/>
           </a:xfrm>
           <a:prstGeom prst="rect">
             <a:avLst/>
@@ -16136,6 +16221,34 @@
 </file>
 
 <file path=customXml/item1.xml><?xml version="1.0" encoding="utf-8"?>
+<p:properties xmlns:p="http://schemas.microsoft.com/office/2006/metadata/properties" xmlns:xsi="http://www.w3.org/2001/XMLSchema-instance" xmlns:pc="http://schemas.microsoft.com/office/infopath/2007/PartnerControls">
+  <documentManagement>
+    <Status xmlns="71af3243-3dd4-4a8d-8c0d-dd76da1f02a5">Not started</Status>
+    <_ip_UnifiedCompliancePolicyUIAction xmlns="http://schemas.microsoft.com/sharepoint/v3" xsi:nil="true"/>
+    <Image xmlns="71af3243-3dd4-4a8d-8c0d-dd76da1f02a5">
+      <Url xsi:nil="true"/>
+      <Description xsi:nil="true"/>
+    </Image>
+    <_ip_UnifiedCompliancePolicyProperties xmlns="http://schemas.microsoft.com/sharepoint/v3" xsi:nil="true"/>
+    <ImageTagsTaxHTField xmlns="71af3243-3dd4-4a8d-8c0d-dd76da1f02a5">
+      <Terms xmlns="http://schemas.microsoft.com/office/infopath/2007/PartnerControls"/>
+    </ImageTagsTaxHTField>
+    <TaxCatchAll xmlns="230e9df3-be65-4c73-a93b-d1236ebd677e"/>
+    <MediaServiceKeyPoints xmlns="71af3243-3dd4-4a8d-8c0d-dd76da1f02a5" xsi:nil="true"/>
+  </documentManagement>
+</p:properties>
+</file>
+
+<file path=customXml/item2.xml><?xml version="1.0" encoding="utf-8"?>
+<?mso-contentType ?>
+<FormTemplates xmlns="http://schemas.microsoft.com/sharepoint/v3/contenttype/forms">
+  <Display>DocumentLibraryForm</Display>
+  <Edit>DocumentLibraryForm</Edit>
+  <New>DocumentLibraryForm</New>
+</FormTemplates>
+</file>
+
+<file path=customXml/item3.xml><?xml version="1.0" encoding="utf-8"?>
 <ct:contentTypeSchema xmlns:ct="http://schemas.microsoft.com/office/2006/metadata/contentType" xmlns:ma="http://schemas.microsoft.com/office/2006/metadata/properties/metaAttributes" ct:_="" ma:_="" ma:contentTypeName="Document" ma:contentTypeID="0x01010079F111ED35F8CC479449609E8A0923A6" ma:contentTypeVersion="20" ma:contentTypeDescription="Create a new document." ma:contentTypeScope="" ma:versionID="1267097ee5f5874adfcc408041ae252e">
   <xsd:schema xmlns:xsd="http://www.w3.org/2001/XMLSchema" xmlns:xs="http://www.w3.org/2001/XMLSchema" xmlns:p="http://schemas.microsoft.com/office/2006/metadata/properties" xmlns:ns1="http://schemas.microsoft.com/sharepoint/v3" xmlns:ns2="71af3243-3dd4-4a8d-8c0d-dd76da1f02a5" xmlns:ns3="16c05727-aa75-4e4a-9b5f-8a80a1165891" xmlns:ns4="230e9df3-be65-4c73-a93b-d1236ebd677e" targetNamespace="http://schemas.microsoft.com/office/2006/metadata/properties" ma:root="true" ma:fieldsID="395891a93df65b14727750f2c06c306c" ns1:_="" ns2:_="" ns3:_="" ns4:_="">
     <xsd:import namespace="http://schemas.microsoft.com/sharepoint/v3"/>
@@ -16411,35 +16524,27 @@
 </ct:contentTypeSchema>
 </file>
 
-<file path=customXml/item2.xml><?xml version="1.0" encoding="utf-8"?>
-<?mso-contentType ?>
-<FormTemplates xmlns="http://schemas.microsoft.com/sharepoint/v3/contenttype/forms">
-  <Display>DocumentLibraryForm</Display>
-  <Edit>DocumentLibraryForm</Edit>
-  <New>DocumentLibraryForm</New>
-</FormTemplates>
+<file path=customXml/itemProps1.xml><?xml version="1.0" encoding="utf-8"?>
+<ds:datastoreItem xmlns:ds="http://schemas.openxmlformats.org/officeDocument/2006/customXml" ds:itemID="{455B3D43-99F7-47DF-90D6-3E3028F5936C}">
+  <ds:schemaRefs>
+    <ds:schemaRef ds:uri="http://schemas.microsoft.com/office/2006/metadata/properties"/>
+    <ds:schemaRef ds:uri="http://schemas.microsoft.com/office/infopath/2007/PartnerControls"/>
+    <ds:schemaRef ds:uri="71af3243-3dd4-4a8d-8c0d-dd76da1f02a5"/>
+    <ds:schemaRef ds:uri="http://schemas.microsoft.com/sharepoint/v3"/>
+    <ds:schemaRef ds:uri="230e9df3-be65-4c73-a93b-d1236ebd677e"/>
+  </ds:schemaRefs>
+</ds:datastoreItem>
 </file>
 
-<file path=customXml/item3.xml><?xml version="1.0" encoding="utf-8"?>
-<p:properties xmlns:p="http://schemas.microsoft.com/office/2006/metadata/properties" xmlns:xsi="http://www.w3.org/2001/XMLSchema-instance" xmlns:pc="http://schemas.microsoft.com/office/infopath/2007/PartnerControls">
-  <documentManagement>
-    <Status xmlns="71af3243-3dd4-4a8d-8c0d-dd76da1f02a5">Not started</Status>
-    <_ip_UnifiedCompliancePolicyUIAction xmlns="http://schemas.microsoft.com/sharepoint/v3" xsi:nil="true"/>
-    <Image xmlns="71af3243-3dd4-4a8d-8c0d-dd76da1f02a5">
-      <Url xsi:nil="true"/>
-      <Description xsi:nil="true"/>
-    </Image>
-    <_ip_UnifiedCompliancePolicyProperties xmlns="http://schemas.microsoft.com/sharepoint/v3" xsi:nil="true"/>
-    <ImageTagsTaxHTField xmlns="71af3243-3dd4-4a8d-8c0d-dd76da1f02a5">
-      <Terms xmlns="http://schemas.microsoft.com/office/infopath/2007/PartnerControls"/>
-    </ImageTagsTaxHTField>
-    <TaxCatchAll xmlns="230e9df3-be65-4c73-a93b-d1236ebd677e"/>
-    <MediaServiceKeyPoints xmlns="71af3243-3dd4-4a8d-8c0d-dd76da1f02a5" xsi:nil="true"/>
-  </documentManagement>
-</p:properties>
+<file path=customXml/itemProps2.xml><?xml version="1.0" encoding="utf-8"?>
+<ds:datastoreItem xmlns:ds="http://schemas.openxmlformats.org/officeDocument/2006/customXml" ds:itemID="{D0025B34-BD2B-4F65-80AF-217925182ED3}">
+  <ds:schemaRefs>
+    <ds:schemaRef ds:uri="http://schemas.microsoft.com/sharepoint/v3/contenttype/forms"/>
+  </ds:schemaRefs>
+</ds:datastoreItem>
 </file>
 
-<file path=customXml/itemProps1.xml><?xml version="1.0" encoding="utf-8"?>
+<file path=customXml/itemProps3.xml><?xml version="1.0" encoding="utf-8"?>
 <ds:datastoreItem xmlns:ds="http://schemas.openxmlformats.org/officeDocument/2006/customXml" ds:itemID="{6B2BE0AF-90CB-4C86-BB1E-26E501BCE9E3}">
   <ds:schemaRefs>
     <ds:schemaRef ds:uri="http://schemas.microsoft.com/office/2006/metadata/contentType"/>
@@ -16458,24 +16563,4 @@
     <ds:schemaRef ds:uri="http://schemas.microsoft.com/internal/obd"/>
   </ds:schemaRefs>
 </ds:datastoreItem>
-</file>
-
-<file path=customXml/itemProps2.xml><?xml version="1.0" encoding="utf-8"?>
-<ds:datastoreItem xmlns:ds="http://schemas.openxmlformats.org/officeDocument/2006/customXml" ds:itemID="{D0025B34-BD2B-4F65-80AF-217925182ED3}">
-  <ds:schemaRefs>
-    <ds:schemaRef ds:uri="http://schemas.microsoft.com/sharepoint/v3/contenttype/forms"/>
-  </ds:schemaRefs>
-</ds:datastoreItem>
-</file>
-
-<file path=customXml/itemProps3.xml><?xml version="1.0" encoding="utf-8"?>
-<ds:datastoreItem xmlns:ds="http://schemas.openxmlformats.org/officeDocument/2006/customXml" ds:itemID="{455B3D43-99F7-47DF-90D6-3E3028F5936C}">
-  <ds:schemaRefs>
-    <ds:schemaRef ds:uri="http://schemas.microsoft.com/office/2006/metadata/properties"/>
-    <ds:schemaRef ds:uri="http://schemas.microsoft.com/office/infopath/2007/PartnerControls"/>
-    <ds:schemaRef ds:uri="71af3243-3dd4-4a8d-8c0d-dd76da1f02a5"/>
-    <ds:schemaRef ds:uri="http://schemas.microsoft.com/sharepoint/v3"/>
-    <ds:schemaRef ds:uri="230e9df3-be65-4c73-a93b-d1236ebd677e"/>
-  </ds:schemaRefs>
-</ds:datastoreItem>
 </file>
</xml_diff>